<commit_message>
Committing updates to the course.
</commit_message>
<xml_diff>
--- a/courseMaterial/Objective-3-Primitives Data Types & String/1-Data Types [Autosaved].pptx
+++ b/courseMaterial/Objective-3-Primitives Data Types & String/1-Data Types [Autosaved].pptx
@@ -247,7 +247,7 @@
             <a:fld id="{68416927-5E9C-4E77-85FE-EE4C81C1DE39}" type="datetimeFigureOut">
               <a:rPr lang="en-US" smtClean="0"/>
               <a:pPr/>
-              <a:t>5/17/2020</a:t>
+              <a:t>5/18/2020</a:t>
             </a:fld>
             <a:endParaRPr lang="en-US" dirty="0"/>
           </a:p>
@@ -426,7 +426,7 @@
             <a:fld id="{FA798B7E-6604-4F74-86DB-B30627D56244}" type="datetimeFigureOut">
               <a:rPr lang="en-US" smtClean="0"/>
               <a:pPr/>
-              <a:t>5/17/2020</a:t>
+              <a:t>5/18/2020</a:t>
             </a:fld>
             <a:endParaRPr lang="en-US" dirty="0"/>
           </a:p>
@@ -4906,7 +4906,7 @@
                 <a16:creationId xmlns:a16="http://schemas.microsoft.com/office/drawing/2014/main" id="{5F253864-26FA-4AB1-9F0A-4F57D870EE85}"/>
               </a:ext>
               <a:ext uri="{C183D7F6-B498-43B3-948B-1728B52AA6E4}">
-                <adec:decorative xmlns:adec="http://schemas.microsoft.com/office/drawing/2017/decorative" xmlns="" val="1"/>
+                <adec:decorative xmlns="" xmlns:adec="http://schemas.microsoft.com/office/drawing/2017/decorative" val="1"/>
               </a:ext>
             </a:extLst>
           </p:cNvPr>
@@ -5151,7 +5151,7 @@
                 <a16:creationId xmlns:a16="http://schemas.microsoft.com/office/drawing/2014/main" id="{5F253864-26FA-4AB1-9F0A-4F57D870EE85}"/>
               </a:ext>
               <a:ext uri="{C183D7F6-B498-43B3-948B-1728B52AA6E4}">
-                <adec:decorative xmlns:adec="http://schemas.microsoft.com/office/drawing/2017/decorative" xmlns="" val="1"/>
+                <adec:decorative xmlns="" xmlns:adec="http://schemas.microsoft.com/office/drawing/2017/decorative" val="1"/>
               </a:ext>
             </a:extLst>
           </p:cNvPr>
@@ -5371,7 +5371,7 @@
                 <a16:creationId xmlns:a16="http://schemas.microsoft.com/office/drawing/2014/main" id="{5F253864-26FA-4AB1-9F0A-4F57D870EE85}"/>
               </a:ext>
               <a:ext uri="{C183D7F6-B498-43B3-948B-1728B52AA6E4}">
-                <adec:decorative xmlns:adec="http://schemas.microsoft.com/office/drawing/2017/decorative" xmlns="" val="1"/>
+                <adec:decorative xmlns="" xmlns:adec="http://schemas.microsoft.com/office/drawing/2017/decorative" val="1"/>
               </a:ext>
             </a:extLst>
           </p:cNvPr>
@@ -5760,7 +5760,7 @@
                 <a16:creationId xmlns:a16="http://schemas.microsoft.com/office/drawing/2014/main" id="{5F253864-26FA-4AB1-9F0A-4F57D870EE85}"/>
               </a:ext>
               <a:ext uri="{C183D7F6-B498-43B3-948B-1728B52AA6E4}">
-                <adec:decorative xmlns:adec="http://schemas.microsoft.com/office/drawing/2017/decorative" xmlns="" val="1"/>
+                <adec:decorative xmlns="" xmlns:adec="http://schemas.microsoft.com/office/drawing/2017/decorative" val="1"/>
               </a:ext>
             </a:extLst>
           </p:cNvPr>
@@ -6011,7 +6011,7 @@
                 <a16:creationId xmlns:a16="http://schemas.microsoft.com/office/drawing/2014/main" id="{5F253864-26FA-4AB1-9F0A-4F57D870EE85}"/>
               </a:ext>
               <a:ext uri="{C183D7F6-B498-43B3-948B-1728B52AA6E4}">
-                <adec:decorative xmlns:adec="http://schemas.microsoft.com/office/drawing/2017/decorative" xmlns="" val="1"/>
+                <adec:decorative xmlns="" xmlns:adec="http://schemas.microsoft.com/office/drawing/2017/decorative" val="1"/>
               </a:ext>
             </a:extLst>
           </p:cNvPr>
@@ -6272,7 +6272,7 @@
                 <a16:creationId xmlns:a16="http://schemas.microsoft.com/office/drawing/2014/main" id="{5F253864-26FA-4AB1-9F0A-4F57D870EE85}"/>
               </a:ext>
               <a:ext uri="{C183D7F6-B498-43B3-948B-1728B52AA6E4}">
-                <adec:decorative xmlns:adec="http://schemas.microsoft.com/office/drawing/2017/decorative" xmlns="" val="1"/>
+                <adec:decorative xmlns="" xmlns:adec="http://schemas.microsoft.com/office/drawing/2017/decorative" val="1"/>
               </a:ext>
             </a:extLst>
           </p:cNvPr>
@@ -6465,15 +6465,7 @@
           <a:p>
             <a:r>
               <a:rPr lang="en-US" dirty="0" smtClean="0"/>
-              <a:t>Figure showing 3 types of assignments. It also </a:t>
-            </a:r>
-            <a:r>
-              <a:rPr lang="en-US" smtClean="0"/>
-              <a:t>shows narrowing/widening </a:t>
-            </a:r>
-            <a:r>
-              <a:rPr lang="en-US" dirty="0" smtClean="0"/>
-              <a:t>, implicit/explicit.</a:t>
+              <a:t>Figure showing 3 types of assignments. It also shows narrowing/widening , implicit/explicit.</a:t>
             </a:r>
           </a:p>
           <a:p>
@@ -6528,7 +6520,7 @@
                 <a16:creationId xmlns:a16="http://schemas.microsoft.com/office/drawing/2014/main" id="{5F253864-26FA-4AB1-9F0A-4F57D870EE85}"/>
               </a:ext>
               <a:ext uri="{C183D7F6-B498-43B3-948B-1728B52AA6E4}">
-                <adec:decorative xmlns:adec="http://schemas.microsoft.com/office/drawing/2017/decorative" xmlns="" val="1"/>
+                <adec:decorative xmlns="" xmlns:adec="http://schemas.microsoft.com/office/drawing/2017/decorative" val="1"/>
               </a:ext>
             </a:extLst>
           </p:cNvPr>
@@ -6672,11 +6664,57 @@
           </a:bodyPr>
           <a:lstStyle/>
           <a:p>
+            <a:endParaRPr lang="en-US" sz="2400" dirty="0" smtClean="0"/>
+          </a:p>
+          <a:p>
+            <a:endParaRPr lang="en-US" sz="2400" dirty="0"/>
+          </a:p>
+          <a:p>
             <a:r>
               <a:rPr lang="en-US" sz="2400" dirty="0" smtClean="0"/>
-              <a:t>Assig</a:t>
-            </a:r>
-            <a:endParaRPr lang="en-US" sz="2400" dirty="0" smtClean="0"/>
+              <a:t>Assignment can 3 possibilities :</a:t>
+            </a:r>
+          </a:p>
+          <a:p>
+            <a:pPr lvl="1"/>
+            <a:r>
+              <a:rPr lang="en-US" sz="2200" dirty="0" smtClean="0"/>
+              <a:t>Both sides are of equal capacity.</a:t>
+            </a:r>
+          </a:p>
+          <a:p>
+            <a:pPr lvl="1"/>
+            <a:r>
+              <a:rPr lang="en-US" sz="2200" dirty="0" smtClean="0"/>
+              <a:t>Left hand side is larger capacity and righ</a:t>
+            </a:r>
+            <a:r>
+              <a:rPr lang="en-US" sz="2200" dirty="0" smtClean="0"/>
+              <a:t>t hand side is smaller</a:t>
+            </a:r>
+            <a:r>
+              <a:rPr lang="en-US" sz="2200" dirty="0" smtClean="0"/>
+              <a:t>.</a:t>
+            </a:r>
+          </a:p>
+          <a:p>
+            <a:pPr lvl="1"/>
+            <a:r>
+              <a:rPr lang="en-US" sz="2200" dirty="0" smtClean="0"/>
+              <a:t>Right hand side is larger capacity and left hand side is smaller.</a:t>
+            </a:r>
+          </a:p>
+          <a:p>
+            <a:r>
+              <a:rPr lang="en-US" sz="2400" dirty="0" smtClean="0"/>
+              <a:t>Case 2 is referred to as widening.</a:t>
+            </a:r>
+          </a:p>
+          <a:p>
+            <a:r>
+              <a:rPr lang="en-US" sz="2400" dirty="0" smtClean="0"/>
+              <a:t>Case 3 is referred to as narrowing.</a:t>
+            </a:r>
           </a:p>
         </p:txBody>
       </p:sp>
@@ -6722,7 +6760,7 @@
                 <a16:creationId xmlns:a16="http://schemas.microsoft.com/office/drawing/2014/main" id="{5F253864-26FA-4AB1-9F0A-4F57D870EE85}"/>
               </a:ext>
               <a:ext uri="{C183D7F6-B498-43B3-948B-1728B52AA6E4}">
-                <adec:decorative xmlns:adec="http://schemas.microsoft.com/office/drawing/2017/decorative" xmlns="" val="1"/>
+                <adec:decorative xmlns="" xmlns:adec="http://schemas.microsoft.com/office/drawing/2017/decorative" val="1"/>
               </a:ext>
             </a:extLst>
           </p:cNvPr>
@@ -6983,7 +7021,7 @@
                 <a16:creationId xmlns:a16="http://schemas.microsoft.com/office/drawing/2014/main" id="{5F253864-26FA-4AB1-9F0A-4F57D870EE85}"/>
               </a:ext>
               <a:ext uri="{C183D7F6-B498-43B3-948B-1728B52AA6E4}">
-                <adec:decorative xmlns:adec="http://schemas.microsoft.com/office/drawing/2017/decorative" xmlns="" val="1"/>
+                <adec:decorative xmlns="" xmlns:adec="http://schemas.microsoft.com/office/drawing/2017/decorative" val="1"/>
               </a:ext>
             </a:extLst>
           </p:cNvPr>
@@ -7336,7 +7374,7 @@
                 <a16:creationId xmlns:a16="http://schemas.microsoft.com/office/drawing/2014/main" id="{5F253864-26FA-4AB1-9F0A-4F57D870EE85}"/>
               </a:ext>
               <a:ext uri="{C183D7F6-B498-43B3-948B-1728B52AA6E4}">
-                <adec:decorative xmlns:adec="http://schemas.microsoft.com/office/drawing/2017/decorative" xmlns="" val="1"/>
+                <adec:decorative xmlns="" xmlns:adec="http://schemas.microsoft.com/office/drawing/2017/decorative" val="1"/>
               </a:ext>
             </a:extLst>
           </p:cNvPr>
@@ -7620,7 +7658,7 @@
                 <a16:creationId xmlns:a16="http://schemas.microsoft.com/office/drawing/2014/main" id="{5F253864-26FA-4AB1-9F0A-4F57D870EE85}"/>
               </a:ext>
               <a:ext uri="{C183D7F6-B498-43B3-948B-1728B52AA6E4}">
-                <adec:decorative xmlns:adec="http://schemas.microsoft.com/office/drawing/2017/decorative" xmlns="" val="1"/>
+                <adec:decorative xmlns="" xmlns:adec="http://schemas.microsoft.com/office/drawing/2017/decorative" val="1"/>
               </a:ext>
             </a:extLst>
           </p:cNvPr>
@@ -7873,7 +7911,7 @@
                 <a16:creationId xmlns:a16="http://schemas.microsoft.com/office/drawing/2014/main" id="{792980D7-ED01-4955-83DB-59BA18C94FBA}"/>
               </a:ext>
               <a:ext uri="{C183D7F6-B498-43B3-948B-1728B52AA6E4}">
-                <adec:decorative xmlns:adec="http://schemas.microsoft.com/office/drawing/2017/decorative" xmlns="" val="1"/>
+                <adec:decorative xmlns="" xmlns:adec="http://schemas.microsoft.com/office/drawing/2017/decorative" val="1"/>
               </a:ext>
             </a:extLst>
           </p:cNvPr>
@@ -8097,7 +8135,7 @@
                 <a16:creationId xmlns:a16="http://schemas.microsoft.com/office/drawing/2014/main" id="{5F253864-26FA-4AB1-9F0A-4F57D870EE85}"/>
               </a:ext>
               <a:ext uri="{C183D7F6-B498-43B3-948B-1728B52AA6E4}">
-                <adec:decorative xmlns:adec="http://schemas.microsoft.com/office/drawing/2017/decorative" xmlns="" val="1"/>
+                <adec:decorative xmlns="" xmlns:adec="http://schemas.microsoft.com/office/drawing/2017/decorative" val="1"/>
               </a:ext>
             </a:extLst>
           </p:cNvPr>
@@ -8390,7 +8428,7 @@
                 <a16:creationId xmlns:a16="http://schemas.microsoft.com/office/drawing/2014/main" id="{5F253864-26FA-4AB1-9F0A-4F57D870EE85}"/>
               </a:ext>
               <a:ext uri="{C183D7F6-B498-43B3-948B-1728B52AA6E4}">
-                <adec:decorative xmlns:adec="http://schemas.microsoft.com/office/drawing/2017/decorative" xmlns="" val="1"/>
+                <adec:decorative xmlns="" xmlns:adec="http://schemas.microsoft.com/office/drawing/2017/decorative" val="1"/>
               </a:ext>
             </a:extLst>
           </p:cNvPr>
@@ -8589,7 +8627,7 @@
                 <a16:creationId xmlns:a16="http://schemas.microsoft.com/office/drawing/2014/main" id="{5F253864-26FA-4AB1-9F0A-4F57D870EE85}"/>
               </a:ext>
               <a:ext uri="{C183D7F6-B498-43B3-948B-1728B52AA6E4}">
-                <adec:decorative xmlns:adec="http://schemas.microsoft.com/office/drawing/2017/decorative" xmlns="" val="1"/>
+                <adec:decorative xmlns="" xmlns:adec="http://schemas.microsoft.com/office/drawing/2017/decorative" val="1"/>
               </a:ext>
             </a:extLst>
           </p:cNvPr>
@@ -8884,7 +8922,7 @@
                 <a16:creationId xmlns:a16="http://schemas.microsoft.com/office/drawing/2014/main" id="{5F253864-26FA-4AB1-9F0A-4F57D870EE85}"/>
               </a:ext>
               <a:ext uri="{C183D7F6-B498-43B3-948B-1728B52AA6E4}">
-                <adec:decorative xmlns:adec="http://schemas.microsoft.com/office/drawing/2017/decorative" xmlns="" val="1"/>
+                <adec:decorative xmlns="" xmlns:adec="http://schemas.microsoft.com/office/drawing/2017/decorative" val="1"/>
               </a:ext>
             </a:extLst>
           </p:cNvPr>
@@ -9145,7 +9183,7 @@
                 <a16:creationId xmlns:a16="http://schemas.microsoft.com/office/drawing/2014/main" id="{5F253864-26FA-4AB1-9F0A-4F57D870EE85}"/>
               </a:ext>
               <a:ext uri="{C183D7F6-B498-43B3-948B-1728B52AA6E4}">
-                <adec:decorative xmlns:adec="http://schemas.microsoft.com/office/drawing/2017/decorative" xmlns="" val="1"/>
+                <adec:decorative xmlns="" xmlns:adec="http://schemas.microsoft.com/office/drawing/2017/decorative" val="1"/>
               </a:ext>
             </a:extLst>
           </p:cNvPr>
@@ -9421,7 +9459,7 @@
                 <a16:creationId xmlns:a16="http://schemas.microsoft.com/office/drawing/2014/main" id="{5F253864-26FA-4AB1-9F0A-4F57D870EE85}"/>
               </a:ext>
               <a:ext uri="{C183D7F6-B498-43B3-948B-1728B52AA6E4}">
-                <adec:decorative xmlns:adec="http://schemas.microsoft.com/office/drawing/2017/decorative" xmlns="" val="1"/>
+                <adec:decorative xmlns="" xmlns:adec="http://schemas.microsoft.com/office/drawing/2017/decorative" val="1"/>
               </a:ext>
             </a:extLst>
           </p:cNvPr>
@@ -9697,7 +9735,7 @@
                 <a16:creationId xmlns:a16="http://schemas.microsoft.com/office/drawing/2014/main" id="{5F253864-26FA-4AB1-9F0A-4F57D870EE85}"/>
               </a:ext>
               <a:ext uri="{C183D7F6-B498-43B3-948B-1728B52AA6E4}">
-                <adec:decorative xmlns:adec="http://schemas.microsoft.com/office/drawing/2017/decorative" xmlns="" val="1"/>
+                <adec:decorative xmlns="" xmlns:adec="http://schemas.microsoft.com/office/drawing/2017/decorative" val="1"/>
               </a:ext>
             </a:extLst>
           </p:cNvPr>
@@ -10675,15 +10713,6 @@
 </file>
 
 <file path=customXml/item1.xml><?xml version="1.0" encoding="utf-8"?>
-<?mso-contentType ?>
-<FormTemplates xmlns="http://schemas.microsoft.com/sharepoint/v3/contenttype/forms">
-  <Display>DocumentLibraryForm</Display>
-  <Edit>DocumentLibraryForm</Edit>
-  <New>DocumentLibraryForm</New>
-</FormTemplates>
-</file>
-
-<file path=customXml/item2.xml><?xml version="1.0" encoding="utf-8"?>
 <ct:contentTypeSchema xmlns:ct="http://schemas.microsoft.com/office/2006/metadata/contentType" xmlns:ma="http://schemas.microsoft.com/office/2006/metadata/properties/metaAttributes" ct:_="" ma:_="" ma:contentTypeName="Document" ma:contentTypeID="0x01010079F111ED35F8CC479449609E8A0923A6" ma:contentTypeVersion="12" ma:contentTypeDescription="Create a new document." ma:contentTypeScope="" ma:versionID="fa6e671f1cd7e4d96ff9652be322dd5e">
   <xsd:schema xmlns:xsd="http://www.w3.org/2001/XMLSchema" xmlns:xs="http://www.w3.org/2001/XMLSchema" xmlns:p="http://schemas.microsoft.com/office/2006/metadata/properties" xmlns:ns2="71af3243-3dd4-4a8d-8c0d-dd76da1f02a5" xmlns:ns3="16c05727-aa75-4e4a-9b5f-8a80a1165891" targetNamespace="http://schemas.microsoft.com/office/2006/metadata/properties" ma:root="true" ma:fieldsID="4e2496f70b101db0b8013f30a071bbf7" ns2:_="" ns3:_="">
     <xsd:import namespace="71af3243-3dd4-4a8d-8c0d-dd76da1f02a5"/>
@@ -10904,6 +10933,15 @@
 </ct:contentTypeSchema>
 </file>
 
+<file path=customXml/item2.xml><?xml version="1.0" encoding="utf-8"?>
+<?mso-contentType ?>
+<FormTemplates xmlns="http://schemas.microsoft.com/sharepoint/v3/contenttype/forms">
+  <Display>DocumentLibraryForm</Display>
+  <Edit>DocumentLibraryForm</Edit>
+  <New>DocumentLibraryForm</New>
+</FormTemplates>
+</file>
+
 <file path=customXml/item3.xml><?xml version="1.0" encoding="utf-8"?>
 <p:properties xmlns:p="http://schemas.microsoft.com/office/2006/metadata/properties" xmlns:xsi="http://www.w3.org/2001/XMLSchema-instance" xmlns:pc="http://schemas.microsoft.com/office/infopath/2007/PartnerControls">
   <documentManagement>
@@ -10914,14 +10952,6 @@
 </file>
 
 <file path=customXml/itemProps1.xml><?xml version="1.0" encoding="utf-8"?>
-<ds:datastoreItem xmlns:ds="http://schemas.openxmlformats.org/officeDocument/2006/customXml" ds:itemID="{EBB7C387-AFDC-4FE3-A658-984B7F35F155}">
-  <ds:schemaRefs>
-    <ds:schemaRef ds:uri="http://schemas.microsoft.com/sharepoint/v3/contenttype/forms"/>
-  </ds:schemaRefs>
-</ds:datastoreItem>
-</file>
-
-<file path=customXml/itemProps2.xml><?xml version="1.0" encoding="utf-8"?>
 <ds:datastoreItem xmlns:ds="http://schemas.openxmlformats.org/officeDocument/2006/customXml" ds:itemID="{D6766BD6-F648-49AA-B7EC-13E75CECB99A}">
   <ds:schemaRefs>
     <ds:schemaRef ds:uri="http://schemas.microsoft.com/office/2006/metadata/contentType"/>
@@ -10940,6 +10970,14 @@
 </ds:datastoreItem>
 </file>
 
+<file path=customXml/itemProps2.xml><?xml version="1.0" encoding="utf-8"?>
+<ds:datastoreItem xmlns:ds="http://schemas.openxmlformats.org/officeDocument/2006/customXml" ds:itemID="{EBB7C387-AFDC-4FE3-A658-984B7F35F155}">
+  <ds:schemaRefs>
+    <ds:schemaRef ds:uri="http://schemas.microsoft.com/sharepoint/v3/contenttype/forms"/>
+  </ds:schemaRefs>
+</ds:datastoreItem>
+</file>
+
 <file path=customXml/itemProps3.xml><?xml version="1.0" encoding="utf-8"?>
 <ds:datastoreItem xmlns:ds="http://schemas.openxmlformats.org/officeDocument/2006/customXml" ds:itemID="{F4E32C0B-4052-44CB-9341-8AD8B2CC4712}">
   <ds:schemaRefs>

</xml_diff>